<commit_message>
Added link on final page of dark-side talk
</commit_message>
<xml_diff>
--- a/dark-side/2021-talk.pptx
+++ b/dark-side/2021-talk.pptx
@@ -34063,6 +34063,26 @@
                 <a:hlinkClick r:id="rId3"/>
               </a:rPr>
               <a:t>simons@umkc.edu</a:t>
+            </a:r>
+          </a:p>
+          <a:p>
+            <a:pPr lvl="0" marL="0" indent="0">
+              <a:buNone/>
+            </a:pPr>
+            <a:r>
+              <a:rPr/>
+              <a:t>You can find my talk here:</a:t>
+            </a:r>
+          </a:p>
+          <a:p>
+            <a:pPr lvl="0" marL="0" indent="0">
+              <a:buNone/>
+            </a:pPr>
+            <a:r>
+              <a:rPr>
+                <a:hlinkClick r:id="rId4"/>
+              </a:rPr>
+              <a:t>https://github.com/pmean/papers-and-presentations/blob/master/dark-side/2021-talk.pptx</a:t>
             </a:r>
           </a:p>
         </p:txBody>

</xml_diff>